<commit_message>
maps of environmental variables
</commit_message>
<xml_diff>
--- a/figures/site_map_edits.pptx
+++ b/figures/site_map_edits.pptx
@@ -104,6 +104,11 @@
       </a:defRPr>
     </a:lvl9pPr>
   </p:defaultTextStyle>
+  <p:extLst>
+    <p:ext uri="{EFAFB233-063F-42B5-8137-9DF3F51BA10A}">
+      <p15:sldGuideLst xmlns:p15="http://schemas.microsoft.com/office/powerpoint/2012/main"/>
+    </p:ext>
+  </p:extLst>
 </p:presentation>
 </file>
 
@@ -254,7 +259,7 @@
           <a:p>
             <a:fld id="{38C3BB62-CB55-C647-A3CF-D6BEC6AE220C}" type="datetimeFigureOut">
               <a:rPr lang="en-US" smtClean="0"/>
-              <a:t>3/25/24</a:t>
+              <a:t>4/17/24</a:t>
             </a:fld>
             <a:endParaRPr lang="en-US"/>
           </a:p>
@@ -452,7 +457,7 @@
           <a:p>
             <a:fld id="{38C3BB62-CB55-C647-A3CF-D6BEC6AE220C}" type="datetimeFigureOut">
               <a:rPr lang="en-US" smtClean="0"/>
-              <a:t>3/25/24</a:t>
+              <a:t>4/17/24</a:t>
             </a:fld>
             <a:endParaRPr lang="en-US"/>
           </a:p>
@@ -660,7 +665,7 @@
           <a:p>
             <a:fld id="{38C3BB62-CB55-C647-A3CF-D6BEC6AE220C}" type="datetimeFigureOut">
               <a:rPr lang="en-US" smtClean="0"/>
-              <a:t>3/25/24</a:t>
+              <a:t>4/17/24</a:t>
             </a:fld>
             <a:endParaRPr lang="en-US"/>
           </a:p>
@@ -858,7 +863,7 @@
           <a:p>
             <a:fld id="{38C3BB62-CB55-C647-A3CF-D6BEC6AE220C}" type="datetimeFigureOut">
               <a:rPr lang="en-US" smtClean="0"/>
-              <a:t>3/25/24</a:t>
+              <a:t>4/17/24</a:t>
             </a:fld>
             <a:endParaRPr lang="en-US"/>
           </a:p>
@@ -1133,7 +1138,7 @@
           <a:p>
             <a:fld id="{38C3BB62-CB55-C647-A3CF-D6BEC6AE220C}" type="datetimeFigureOut">
               <a:rPr lang="en-US" smtClean="0"/>
-              <a:t>3/25/24</a:t>
+              <a:t>4/17/24</a:t>
             </a:fld>
             <a:endParaRPr lang="en-US"/>
           </a:p>
@@ -1398,7 +1403,7 @@
           <a:p>
             <a:fld id="{38C3BB62-CB55-C647-A3CF-D6BEC6AE220C}" type="datetimeFigureOut">
               <a:rPr lang="en-US" smtClean="0"/>
-              <a:t>3/25/24</a:t>
+              <a:t>4/17/24</a:t>
             </a:fld>
             <a:endParaRPr lang="en-US"/>
           </a:p>
@@ -1810,7 +1815,7 @@
           <a:p>
             <a:fld id="{38C3BB62-CB55-C647-A3CF-D6BEC6AE220C}" type="datetimeFigureOut">
               <a:rPr lang="en-US" smtClean="0"/>
-              <a:t>3/25/24</a:t>
+              <a:t>4/17/24</a:t>
             </a:fld>
             <a:endParaRPr lang="en-US"/>
           </a:p>
@@ -1951,7 +1956,7 @@
           <a:p>
             <a:fld id="{38C3BB62-CB55-C647-A3CF-D6BEC6AE220C}" type="datetimeFigureOut">
               <a:rPr lang="en-US" smtClean="0"/>
-              <a:t>3/25/24</a:t>
+              <a:t>4/17/24</a:t>
             </a:fld>
             <a:endParaRPr lang="en-US"/>
           </a:p>
@@ -2064,7 +2069,7 @@
           <a:p>
             <a:fld id="{38C3BB62-CB55-C647-A3CF-D6BEC6AE220C}" type="datetimeFigureOut">
               <a:rPr lang="en-US" smtClean="0"/>
-              <a:t>3/25/24</a:t>
+              <a:t>4/17/24</a:t>
             </a:fld>
             <a:endParaRPr lang="en-US"/>
           </a:p>
@@ -2375,7 +2380,7 @@
           <a:p>
             <a:fld id="{38C3BB62-CB55-C647-A3CF-D6BEC6AE220C}" type="datetimeFigureOut">
               <a:rPr lang="en-US" smtClean="0"/>
-              <a:t>3/25/24</a:t>
+              <a:t>4/17/24</a:t>
             </a:fld>
             <a:endParaRPr lang="en-US"/>
           </a:p>
@@ -2663,7 +2668,7 @@
           <a:p>
             <a:fld id="{38C3BB62-CB55-C647-A3CF-D6BEC6AE220C}" type="datetimeFigureOut">
               <a:rPr lang="en-US" smtClean="0"/>
-              <a:t>3/25/24</a:t>
+              <a:t>4/17/24</a:t>
             </a:fld>
             <a:endParaRPr lang="en-US"/>
           </a:p>
@@ -2904,7 +2909,7 @@
           <a:p>
             <a:fld id="{38C3BB62-CB55-C647-A3CF-D6BEC6AE220C}" type="datetimeFigureOut">
               <a:rPr lang="en-US" smtClean="0"/>
-              <a:t>3/25/24</a:t>
+              <a:t>4/17/24</a:t>
             </a:fld>
             <a:endParaRPr lang="en-US"/>
           </a:p>
@@ -3323,10 +3328,10 @@
       </p:grpSpPr>
       <p:pic>
         <p:nvPicPr>
-          <p:cNvPr id="5" name="Picture 4">
-            <a:extLst>
-              <a:ext uri="{FF2B5EF4-FFF2-40B4-BE49-F238E27FC236}">
-                <a16:creationId xmlns:a16="http://schemas.microsoft.com/office/drawing/2014/main" id="{FA309577-C9D2-12AD-2944-F8AD91CBAF92}"/>
+          <p:cNvPr id="3" name="Picture 2">
+            <a:extLst>
+              <a:ext uri="{FF2B5EF4-FFF2-40B4-BE49-F238E27FC236}">
+                <a16:creationId xmlns:a16="http://schemas.microsoft.com/office/drawing/2014/main" id="{89A2B6B7-7A74-3FA0-4DFA-829005E0CBB9}"/>
               </a:ext>
             </a:extLst>
           </p:cNvPr>
@@ -3343,8 +3348,8 @@
         </p:blipFill>
         <p:spPr>
           <a:xfrm>
-            <a:off x="318407" y="708660"/>
-            <a:ext cx="8760506" cy="6132353"/>
+            <a:off x="720378" y="708660"/>
+            <a:ext cx="8371867" cy="5860306"/>
           </a:xfrm>
           <a:prstGeom prst="rect">
             <a:avLst/>
@@ -3482,6 +3487,205 @@
           </a:fillRef>
           <a:effectRef idx="0">
             <a:schemeClr val="dk1"/>
+          </a:effectRef>
+          <a:fontRef idx="minor">
+            <a:schemeClr val="lt1"/>
+          </a:fontRef>
+        </p:style>
+        <p:txBody>
+          <a:bodyPr rtlCol="0" anchor="ctr"/>
+          <a:lstStyle/>
+          <a:p>
+            <a:pPr algn="ctr"/>
+            <a:endParaRPr lang="en-US"/>
+          </a:p>
+        </p:txBody>
+      </p:sp>
+      <p:sp>
+        <p:nvSpPr>
+          <p:cNvPr id="4" name="Rectangle 3">
+            <a:extLst>
+              <a:ext uri="{FF2B5EF4-FFF2-40B4-BE49-F238E27FC236}">
+                <a16:creationId xmlns:a16="http://schemas.microsoft.com/office/drawing/2014/main" id="{A367DFD3-50B7-2044-61F8-3A2930607CD1}"/>
+              </a:ext>
+            </a:extLst>
+          </p:cNvPr>
+          <p:cNvSpPr/>
+          <p:nvPr/>
+        </p:nvSpPr>
+        <p:spPr>
+          <a:xfrm>
+            <a:off x="1387366" y="5475891"/>
+            <a:ext cx="1271751" cy="746234"/>
+          </a:xfrm>
+          <a:prstGeom prst="rect">
+            <a:avLst/>
+          </a:prstGeom>
+          <a:solidFill>
+            <a:srgbClr val="FFFFFF"/>
+          </a:solidFill>
+          <a:ln>
+            <a:solidFill>
+              <a:schemeClr val="tx1"/>
+            </a:solidFill>
+          </a:ln>
+        </p:spPr>
+        <p:style>
+          <a:lnRef idx="2">
+            <a:schemeClr val="accent1">
+              <a:shade val="15000"/>
+            </a:schemeClr>
+          </a:lnRef>
+          <a:fillRef idx="1">
+            <a:schemeClr val="accent1"/>
+          </a:fillRef>
+          <a:effectRef idx="0">
+            <a:schemeClr val="accent1"/>
+          </a:effectRef>
+          <a:fontRef idx="minor">
+            <a:schemeClr val="lt1"/>
+          </a:fontRef>
+        </p:style>
+        <p:txBody>
+          <a:bodyPr rtlCol="0" anchor="ctr"/>
+          <a:lstStyle/>
+          <a:p>
+            <a:r>
+              <a:rPr lang="en-US" sz="1000" b="1" dirty="0">
+                <a:solidFill>
+                  <a:schemeClr val="tx1"/>
+                </a:solidFill>
+                <a:latin typeface="Arial" panose="020B0604020202020204" pitchFamily="34" charset="0"/>
+                <a:cs typeface="Arial" panose="020B0604020202020204" pitchFamily="34" charset="0"/>
+              </a:rPr>
+              <a:t>Reef type</a:t>
+            </a:r>
+          </a:p>
+          <a:p>
+            <a:endParaRPr lang="en-US" sz="300" dirty="0">
+              <a:solidFill>
+                <a:schemeClr val="tx1"/>
+              </a:solidFill>
+              <a:latin typeface="Arial" panose="020B0604020202020204" pitchFamily="34" charset="0"/>
+              <a:cs typeface="Arial" panose="020B0604020202020204" pitchFamily="34" charset="0"/>
+            </a:endParaRPr>
+          </a:p>
+          <a:p>
+            <a:r>
+              <a:rPr lang="en-US" sz="1000" dirty="0">
+                <a:solidFill>
+                  <a:schemeClr val="tx1"/>
+                </a:solidFill>
+                <a:latin typeface="Arial" panose="020B0604020202020204" pitchFamily="34" charset="0"/>
+                <a:cs typeface="Arial" panose="020B0604020202020204" pitchFamily="34" charset="0"/>
+              </a:rPr>
+              <a:t>   Artificial n = 25</a:t>
+            </a:r>
+          </a:p>
+          <a:p>
+            <a:r>
+              <a:rPr lang="en-US" sz="1000" dirty="0">
+                <a:solidFill>
+                  <a:schemeClr val="tx1"/>
+                </a:solidFill>
+                <a:latin typeface="Arial" panose="020B0604020202020204" pitchFamily="34" charset="0"/>
+                <a:cs typeface="Arial" panose="020B0604020202020204" pitchFamily="34" charset="0"/>
+              </a:rPr>
+              <a:t>   Natural n = 68</a:t>
+            </a:r>
+          </a:p>
+        </p:txBody>
+      </p:sp>
+      <p:sp>
+        <p:nvSpPr>
+          <p:cNvPr id="9" name="Oval 8">
+            <a:extLst>
+              <a:ext uri="{FF2B5EF4-FFF2-40B4-BE49-F238E27FC236}">
+                <a16:creationId xmlns:a16="http://schemas.microsoft.com/office/drawing/2014/main" id="{3B56C00D-0BD4-64E0-73DB-AE2652E48167}"/>
+              </a:ext>
+            </a:extLst>
+          </p:cNvPr>
+          <p:cNvSpPr/>
+          <p:nvPr/>
+        </p:nvSpPr>
+        <p:spPr>
+          <a:xfrm>
+            <a:off x="1456887" y="5990897"/>
+            <a:ext cx="84083" cy="84083"/>
+          </a:xfrm>
+          <a:prstGeom prst="ellipse">
+            <a:avLst/>
+          </a:prstGeom>
+          <a:solidFill>
+            <a:srgbClr val="F3494A"/>
+          </a:solidFill>
+          <a:ln>
+            <a:noFill/>
+          </a:ln>
+        </p:spPr>
+        <p:style>
+          <a:lnRef idx="2">
+            <a:schemeClr val="accent1">
+              <a:shade val="15000"/>
+            </a:schemeClr>
+          </a:lnRef>
+          <a:fillRef idx="1">
+            <a:schemeClr val="accent1"/>
+          </a:fillRef>
+          <a:effectRef idx="0">
+            <a:schemeClr val="accent1"/>
+          </a:effectRef>
+          <a:fontRef idx="minor">
+            <a:schemeClr val="lt1"/>
+          </a:fontRef>
+        </p:style>
+        <p:txBody>
+          <a:bodyPr rtlCol="0" anchor="ctr"/>
+          <a:lstStyle/>
+          <a:p>
+            <a:pPr algn="ctr"/>
+            <a:endParaRPr lang="en-US"/>
+          </a:p>
+        </p:txBody>
+      </p:sp>
+      <p:sp>
+        <p:nvSpPr>
+          <p:cNvPr id="10" name="Oval 9">
+            <a:extLst>
+              <a:ext uri="{FF2B5EF4-FFF2-40B4-BE49-F238E27FC236}">
+                <a16:creationId xmlns:a16="http://schemas.microsoft.com/office/drawing/2014/main" id="{6851A8B3-B794-344C-C5E5-D8CFF604B534}"/>
+              </a:ext>
+            </a:extLst>
+          </p:cNvPr>
+          <p:cNvSpPr/>
+          <p:nvPr/>
+        </p:nvSpPr>
+        <p:spPr>
+          <a:xfrm>
+            <a:off x="1456887" y="5827877"/>
+            <a:ext cx="84083" cy="84083"/>
+          </a:xfrm>
+          <a:prstGeom prst="ellipse">
+            <a:avLst/>
+          </a:prstGeom>
+          <a:solidFill>
+            <a:srgbClr val="00CDD2"/>
+          </a:solidFill>
+          <a:ln>
+            <a:noFill/>
+          </a:ln>
+        </p:spPr>
+        <p:style>
+          <a:lnRef idx="2">
+            <a:schemeClr val="accent1">
+              <a:shade val="15000"/>
+            </a:schemeClr>
+          </a:lnRef>
+          <a:fillRef idx="1">
+            <a:schemeClr val="accent1"/>
+          </a:fillRef>
+          <a:effectRef idx="0">
+            <a:schemeClr val="accent1"/>
           </a:effectRef>
           <a:fontRef idx="minor">
             <a:schemeClr val="lt1"/>

</xml_diff>